<commit_message>
Fixing the first slide
</commit_message>
<xml_diff>
--- a/unit_00/html_review/02 CSS.pptx
+++ b/unit_00/html_review/02 CSS.pptx
@@ -6725,7 +6725,7 @@
               </a:rPr>
               <a:t>CSS Review</a:t>
             </a:r>
-            <a:endParaRPr lang="en-US" sz="4400" cap="none" dirty="0">
+            <a:endParaRPr lang="en-US" sz="4400" b="1" cap="none" dirty="0">
               <a:solidFill>
                 <a:schemeClr val="tx1"/>
               </a:solidFill>
@@ -21901,6 +21901,15 @@
 </file>
 
 <file path=customXml/item1.xml><?xml version="1.0" encoding="utf-8"?>
+<?mso-contentType ?>
+<FormTemplates xmlns="http://schemas.microsoft.com/sharepoint/v3/contenttype/forms">
+  <Display>DocumentLibraryForm</Display>
+  <Edit>DocumentLibraryForm</Edit>
+  <New>DocumentLibraryForm</New>
+</FormTemplates>
+</file>
+
+<file path=customXml/item2.xml><?xml version="1.0" encoding="utf-8"?>
 <ct:contentTypeSchema xmlns:ct="http://schemas.microsoft.com/office/2006/metadata/contentType" xmlns:ma="http://schemas.microsoft.com/office/2006/metadata/properties/metaAttributes" ct:_="" ma:_="" ma:contentTypeName="Document" ma:contentTypeID="0x01010079F111ED35F8CC479449609E8A0923A6" ma:contentTypeVersion="12" ma:contentTypeDescription="Create a new document." ma:contentTypeScope="" ma:versionID="a410dd7f93c95333ffa1b60ed6adedd1">
   <xsd:schema xmlns:xsd="http://www.w3.org/2001/XMLSchema" xmlns:xs="http://www.w3.org/2001/XMLSchema" xmlns:p="http://schemas.microsoft.com/office/2006/metadata/properties" xmlns:ns2="71af3243-3dd4-4a8d-8c0d-dd76da1f02a5" xmlns:ns3="16c05727-aa75-4e4a-9b5f-8a80a1165891" targetNamespace="http://schemas.microsoft.com/office/2006/metadata/properties" ma:root="true" ma:fieldsID="a936d9baba76aa3866493feff160faab" ns2:_="" ns3:_="">
     <xsd:import namespace="71af3243-3dd4-4a8d-8c0d-dd76da1f02a5"/>
@@ -22121,7 +22130,7 @@
 </ct:contentTypeSchema>
 </file>
 
-<file path=customXml/item2.xml><?xml version="1.0" encoding="utf-8"?>
+<file path=customXml/item3.xml><?xml version="1.0" encoding="utf-8"?>
 <p:properties xmlns:p="http://schemas.microsoft.com/office/2006/metadata/properties" xmlns:xsi="http://www.w3.org/2001/XMLSchema-instance" xmlns:pc="http://schemas.microsoft.com/office/infopath/2007/PartnerControls">
   <documentManagement>
     <Status xmlns="71af3243-3dd4-4a8d-8c0d-dd76da1f02a5">Not started</Status>
@@ -22130,16 +22139,15 @@
 </p:properties>
 </file>
 
-<file path=customXml/item3.xml><?xml version="1.0" encoding="utf-8"?>
-<?mso-contentType ?>
-<FormTemplates xmlns="http://schemas.microsoft.com/sharepoint/v3/contenttype/forms">
-  <Display>DocumentLibraryForm</Display>
-  <Edit>DocumentLibraryForm</Edit>
-  <New>DocumentLibraryForm</New>
-</FormTemplates>
+<file path=customXml/itemProps1.xml><?xml version="1.0" encoding="utf-8"?>
+<ds:datastoreItem xmlns:ds="http://schemas.openxmlformats.org/officeDocument/2006/customXml" ds:itemID="{CDB58277-F8DF-46FF-84EC-EF41B835E69F}">
+  <ds:schemaRefs>
+    <ds:schemaRef ds:uri="http://schemas.microsoft.com/sharepoint/v3/contenttype/forms"/>
+  </ds:schemaRefs>
+</ds:datastoreItem>
 </file>
 
-<file path=customXml/itemProps1.xml><?xml version="1.0" encoding="utf-8"?>
+<file path=customXml/itemProps2.xml><?xml version="1.0" encoding="utf-8"?>
 <ds:datastoreItem xmlns:ds="http://schemas.openxmlformats.org/officeDocument/2006/customXml" ds:itemID="{2D276E62-80A3-44DD-9BCC-97ED2B99B57F}">
   <ds:schemaRefs>
     <ds:schemaRef ds:uri="http://schemas.microsoft.com/office/2006/metadata/contentType"/>
@@ -22158,7 +22166,7 @@
 </ds:datastoreItem>
 </file>
 
-<file path=customXml/itemProps2.xml><?xml version="1.0" encoding="utf-8"?>
+<file path=customXml/itemProps3.xml><?xml version="1.0" encoding="utf-8"?>
 <ds:datastoreItem xmlns:ds="http://schemas.openxmlformats.org/officeDocument/2006/customXml" ds:itemID="{137651BA-F45C-4845-9AB3-E0A65B39F5E1}">
   <ds:schemaRefs>
     <ds:schemaRef ds:uri="http://schemas.microsoft.com/office/2006/documentManagement/types"/>
@@ -22173,12 +22181,4 @@
     <ds:schemaRef ds:uri="http://www.w3.org/XML/1998/namespace"/>
   </ds:schemaRefs>
 </ds:datastoreItem>
-</file>
-
-<file path=customXml/itemProps3.xml><?xml version="1.0" encoding="utf-8"?>
-<ds:datastoreItem xmlns:ds="http://schemas.openxmlformats.org/officeDocument/2006/customXml" ds:itemID="{CDB58277-F8DF-46FF-84EC-EF41B835E69F}">
-  <ds:schemaRefs>
-    <ds:schemaRef ds:uri="http://schemas.microsoft.com/sharepoint/v3/contenttype/forms"/>
-  </ds:schemaRefs>
-</ds:datastoreItem>
 </file>
</xml_diff>